<commit_message>
[update] Support Untitled file
- Add VSCode command check function.
- Support Untitled file.
- Update README.md.
- Update icon file.
</commit_message>
<xml_diff>
--- a/icon/icon.pptx
+++ b/icon/icon.pptx
@@ -243,7 +243,7 @@
           <a:p>
             <a:fld id="{F810C2E4-AF92-4DDE-9263-A529A69366F4}" type="datetimeFigureOut">
               <a:rPr kumimoji="1" lang="ja-JP" altLang="en-US" smtClean="0"/>
-              <a:t>2019/12/31</a:t>
+              <a:t>2020/1/10</a:t>
             </a:fld>
             <a:endParaRPr kumimoji="1" lang="ja-JP" altLang="en-US"/>
           </a:p>
@@ -445,7 +445,7 @@
           <a:p>
             <a:fld id="{F810C2E4-AF92-4DDE-9263-A529A69366F4}" type="datetimeFigureOut">
               <a:rPr kumimoji="1" lang="ja-JP" altLang="en-US" smtClean="0"/>
-              <a:t>2019/12/31</a:t>
+              <a:t>2020/1/10</a:t>
             </a:fld>
             <a:endParaRPr kumimoji="1" lang="ja-JP" altLang="en-US"/>
           </a:p>
@@ -657,7 +657,7 @@
           <a:p>
             <a:fld id="{F810C2E4-AF92-4DDE-9263-A529A69366F4}" type="datetimeFigureOut">
               <a:rPr kumimoji="1" lang="ja-JP" altLang="en-US" smtClean="0"/>
-              <a:t>2019/12/31</a:t>
+              <a:t>2020/1/10</a:t>
             </a:fld>
             <a:endParaRPr kumimoji="1" lang="ja-JP" altLang="en-US"/>
           </a:p>
@@ -859,7 +859,7 @@
           <a:p>
             <a:fld id="{F810C2E4-AF92-4DDE-9263-A529A69366F4}" type="datetimeFigureOut">
               <a:rPr kumimoji="1" lang="ja-JP" altLang="en-US" smtClean="0"/>
-              <a:t>2019/12/31</a:t>
+              <a:t>2020/1/10</a:t>
             </a:fld>
             <a:endParaRPr kumimoji="1" lang="ja-JP" altLang="en-US"/>
           </a:p>
@@ -1105,7 +1105,7 @@
           <a:p>
             <a:fld id="{F810C2E4-AF92-4DDE-9263-A529A69366F4}" type="datetimeFigureOut">
               <a:rPr kumimoji="1" lang="ja-JP" altLang="en-US" smtClean="0"/>
-              <a:t>2019/12/31</a:t>
+              <a:t>2020/1/10</a:t>
             </a:fld>
             <a:endParaRPr kumimoji="1" lang="ja-JP" altLang="en-US"/>
           </a:p>
@@ -1401,7 +1401,7 @@
           <a:p>
             <a:fld id="{F810C2E4-AF92-4DDE-9263-A529A69366F4}" type="datetimeFigureOut">
               <a:rPr kumimoji="1" lang="ja-JP" altLang="en-US" smtClean="0"/>
-              <a:t>2019/12/31</a:t>
+              <a:t>2020/1/10</a:t>
             </a:fld>
             <a:endParaRPr kumimoji="1" lang="ja-JP" altLang="en-US"/>
           </a:p>
@@ -1832,7 +1832,7 @@
           <a:p>
             <a:fld id="{F810C2E4-AF92-4DDE-9263-A529A69366F4}" type="datetimeFigureOut">
               <a:rPr kumimoji="1" lang="ja-JP" altLang="en-US" smtClean="0"/>
-              <a:t>2019/12/31</a:t>
+              <a:t>2020/1/10</a:t>
             </a:fld>
             <a:endParaRPr kumimoji="1" lang="ja-JP" altLang="en-US"/>
           </a:p>
@@ -1950,7 +1950,7 @@
           <a:p>
             <a:fld id="{F810C2E4-AF92-4DDE-9263-A529A69366F4}" type="datetimeFigureOut">
               <a:rPr kumimoji="1" lang="ja-JP" altLang="en-US" smtClean="0"/>
-              <a:t>2019/12/31</a:t>
+              <a:t>2020/1/10</a:t>
             </a:fld>
             <a:endParaRPr kumimoji="1" lang="ja-JP" altLang="en-US"/>
           </a:p>
@@ -2045,7 +2045,7 @@
           <a:p>
             <a:fld id="{F810C2E4-AF92-4DDE-9263-A529A69366F4}" type="datetimeFigureOut">
               <a:rPr kumimoji="1" lang="ja-JP" altLang="en-US" smtClean="0"/>
-              <a:t>2019/12/31</a:t>
+              <a:t>2020/1/10</a:t>
             </a:fld>
             <a:endParaRPr kumimoji="1" lang="ja-JP" altLang="en-US"/>
           </a:p>
@@ -2354,7 +2354,7 @@
           <a:p>
             <a:fld id="{F810C2E4-AF92-4DDE-9263-A529A69366F4}" type="datetimeFigureOut">
               <a:rPr kumimoji="1" lang="ja-JP" altLang="en-US" smtClean="0"/>
-              <a:t>2019/12/31</a:t>
+              <a:t>2020/1/10</a:t>
             </a:fld>
             <a:endParaRPr kumimoji="1" lang="ja-JP" altLang="en-US"/>
           </a:p>
@@ -2607,7 +2607,7 @@
           <a:p>
             <a:fld id="{F810C2E4-AF92-4DDE-9263-A529A69366F4}" type="datetimeFigureOut">
               <a:rPr kumimoji="1" lang="ja-JP" altLang="en-US" smtClean="0"/>
-              <a:t>2019/12/31</a:t>
+              <a:t>2020/1/10</a:t>
             </a:fld>
             <a:endParaRPr kumimoji="1" lang="ja-JP" altLang="en-US"/>
           </a:p>
@@ -2852,7 +2852,7 @@
           <a:p>
             <a:fld id="{F810C2E4-AF92-4DDE-9263-A529A69366F4}" type="datetimeFigureOut">
               <a:rPr kumimoji="1" lang="ja-JP" altLang="en-US" smtClean="0"/>
-              <a:t>2019/12/31</a:t>
+              <a:t>2020/1/10</a:t>
             </a:fld>
             <a:endParaRPr kumimoji="1" lang="ja-JP" altLang="en-US"/>
           </a:p>
@@ -3384,6 +3384,144 @@
           </a:prstGeom>
         </p:spPr>
       </p:pic>
+      <p:sp>
+        <p:nvSpPr>
+          <p:cNvPr id="3" name="正方形/長方形 2"/>
+          <p:cNvSpPr/>
+          <p:nvPr/>
+        </p:nvSpPr>
+        <p:spPr>
+          <a:xfrm>
+            <a:off x="9183315" y="340744"/>
+            <a:ext cx="718457" cy="653143"/>
+          </a:xfrm>
+          <a:prstGeom prst="rect">
+            <a:avLst/>
+          </a:prstGeom>
+          <a:solidFill>
+            <a:srgbClr val="FF0000"/>
+          </a:solidFill>
+          <a:ln>
+            <a:noFill/>
+          </a:ln>
+        </p:spPr>
+        <p:style>
+          <a:lnRef idx="2">
+            <a:schemeClr val="accent1">
+              <a:shade val="50000"/>
+            </a:schemeClr>
+          </a:lnRef>
+          <a:fillRef idx="1">
+            <a:schemeClr val="accent1"/>
+          </a:fillRef>
+          <a:effectRef idx="0">
+            <a:schemeClr val="accent1"/>
+          </a:effectRef>
+          <a:fontRef idx="minor">
+            <a:schemeClr val="lt1"/>
+          </a:fontRef>
+        </p:style>
+        <p:txBody>
+          <a:bodyPr rtlCol="0" anchor="ctr"/>
+          <a:lstStyle/>
+          <a:p>
+            <a:pPr algn="ctr"/>
+            <a:endParaRPr kumimoji="1" lang="ja-JP" altLang="en-US"/>
+          </a:p>
+        </p:txBody>
+      </p:sp>
+      <p:sp>
+        <p:nvSpPr>
+          <p:cNvPr id="9" name="正方形/長方形 8"/>
+          <p:cNvSpPr/>
+          <p:nvPr/>
+        </p:nvSpPr>
+        <p:spPr>
+          <a:xfrm>
+            <a:off x="8346909" y="373401"/>
+            <a:ext cx="718457" cy="653143"/>
+          </a:xfrm>
+          <a:prstGeom prst="rect">
+            <a:avLst/>
+          </a:prstGeom>
+          <a:solidFill>
+            <a:srgbClr val="FFFF00"/>
+          </a:solidFill>
+          <a:ln>
+            <a:noFill/>
+          </a:ln>
+        </p:spPr>
+        <p:style>
+          <a:lnRef idx="2">
+            <a:schemeClr val="accent1">
+              <a:shade val="50000"/>
+            </a:schemeClr>
+          </a:lnRef>
+          <a:fillRef idx="1">
+            <a:schemeClr val="accent1"/>
+          </a:fillRef>
+          <a:effectRef idx="0">
+            <a:schemeClr val="accent1"/>
+          </a:effectRef>
+          <a:fontRef idx="minor">
+            <a:schemeClr val="lt1"/>
+          </a:fontRef>
+        </p:style>
+        <p:txBody>
+          <a:bodyPr rtlCol="0" anchor="ctr"/>
+          <a:lstStyle/>
+          <a:p>
+            <a:pPr algn="ctr"/>
+            <a:endParaRPr kumimoji="1" lang="ja-JP" altLang="en-US"/>
+          </a:p>
+        </p:txBody>
+      </p:sp>
+      <p:sp>
+        <p:nvSpPr>
+          <p:cNvPr id="10" name="正方形/長方形 9"/>
+          <p:cNvSpPr/>
+          <p:nvPr/>
+        </p:nvSpPr>
+        <p:spPr>
+          <a:xfrm>
+            <a:off x="7569477" y="340744"/>
+            <a:ext cx="718457" cy="653143"/>
+          </a:xfrm>
+          <a:prstGeom prst="rect">
+            <a:avLst/>
+          </a:prstGeom>
+          <a:solidFill>
+            <a:srgbClr val="92D050"/>
+          </a:solidFill>
+          <a:ln>
+            <a:noFill/>
+          </a:ln>
+        </p:spPr>
+        <p:style>
+          <a:lnRef idx="2">
+            <a:schemeClr val="accent1">
+              <a:shade val="50000"/>
+            </a:schemeClr>
+          </a:lnRef>
+          <a:fillRef idx="1">
+            <a:schemeClr val="accent1"/>
+          </a:fillRef>
+          <a:effectRef idx="0">
+            <a:schemeClr val="accent1"/>
+          </a:effectRef>
+          <a:fontRef idx="minor">
+            <a:schemeClr val="lt1"/>
+          </a:fontRef>
+        </p:style>
+        <p:txBody>
+          <a:bodyPr rtlCol="0" anchor="ctr"/>
+          <a:lstStyle/>
+          <a:p>
+            <a:pPr algn="ctr"/>
+            <a:endParaRPr kumimoji="1" lang="ja-JP" altLang="en-US"/>
+          </a:p>
+        </p:txBody>
+      </p:sp>
       <p:pic>
         <p:nvPicPr>
           <p:cNvPr id="13" name="図 12"/>

</xml_diff>

<commit_message>
[add] add social preview image
</commit_message>
<xml_diff>
--- a/icon/icon.pptx
+++ b/icon/icon.pptx
@@ -6,6 +6,7 @@
   </p:sldMasterIdLst>
   <p:sldIdLst>
     <p:sldId id="256" r:id="rId2"/>
+    <p:sldId id="257" r:id="rId3"/>
   </p:sldIdLst>
   <p:sldSz cx="12192000" cy="6858000"/>
   <p:notesSz cx="6858000" cy="9144000"/>
@@ -112,6 +113,18 @@
 </p:presentation>
 </file>
 
+<file path=ppt/commentAuthors.xml><?xml version="1.0" encoding="utf-8"?>
+<p:cmAuthorLst xmlns:a="http://schemas.openxmlformats.org/drawingml/2006/main" xmlns:r="http://schemas.openxmlformats.org/officeDocument/2006/relationships" xmlns:p="http://schemas.openxmlformats.org/presentationml/2006/main">
+  <p:cmAuthor id="1" name="奥山 隆史" initials="奥山" lastIdx="1" clrIdx="0">
+    <p:extLst>
+      <p:ext uri="{19B8F6BF-5375-455C-9EA6-DF929625EA0E}">
+        <p15:presenceInfo xmlns:p15="http://schemas.microsoft.com/office/powerpoint/2012/main" userId="1b299222e4de016b" providerId="Windows Live"/>
+      </p:ext>
+    </p:extLst>
+  </p:cmAuthor>
+</p:cmAuthorLst>
+</file>
+
 <file path=ppt/slideLayouts/slideLayout1.xml><?xml version="1.0" encoding="utf-8"?>
 <p:sldLayout xmlns:a="http://schemas.openxmlformats.org/drawingml/2006/main" xmlns:r="http://schemas.openxmlformats.org/officeDocument/2006/relationships" xmlns:p="http://schemas.openxmlformats.org/presentationml/2006/main" type="title" preserve="1">
   <p:cSld name="タイトル スライド">
@@ -154,10 +167,9 @@
           </a:lstStyle>
           <a:p>
             <a:r>
-              <a:rPr kumimoji="1" lang="ja-JP" altLang="en-US" smtClean="0"/>
+              <a:rPr kumimoji="1" lang="ja-JP" altLang="en-US"/>
               <a:t>マスター タイトルの書式設定</a:t>
             </a:r>
-            <a:endParaRPr kumimoji="1" lang="ja-JP" altLang="en-US"/>
           </a:p>
         </p:txBody>
       </p:sp>
@@ -219,10 +231,9 @@
           </a:lstStyle>
           <a:p>
             <a:r>
-              <a:rPr kumimoji="1" lang="ja-JP" altLang="en-US" smtClean="0"/>
+              <a:rPr kumimoji="1" lang="ja-JP" altLang="en-US"/>
               <a:t>マスター サブタイトルの書式設定</a:t>
             </a:r>
-            <a:endParaRPr kumimoji="1" lang="ja-JP" altLang="en-US"/>
           </a:p>
         </p:txBody>
       </p:sp>
@@ -243,7 +254,7 @@
           <a:p>
             <a:fld id="{F810C2E4-AF92-4DDE-9263-A529A69366F4}" type="datetimeFigureOut">
               <a:rPr kumimoji="1" lang="ja-JP" altLang="en-US" smtClean="0"/>
-              <a:t>2020/1/10</a:t>
+              <a:t>2021/11/18</a:t>
             </a:fld>
             <a:endParaRPr kumimoji="1" lang="ja-JP" altLang="en-US"/>
           </a:p>
@@ -337,10 +348,9 @@
           <a:lstStyle/>
           <a:p>
             <a:r>
-              <a:rPr kumimoji="1" lang="ja-JP" altLang="en-US" smtClean="0"/>
+              <a:rPr kumimoji="1" lang="ja-JP" altLang="en-US"/>
               <a:t>マスター タイトルの書式設定</a:t>
             </a:r>
-            <a:endParaRPr kumimoji="1" lang="ja-JP" altLang="en-US"/>
           </a:p>
         </p:txBody>
       </p:sp>
@@ -361,70 +371,69 @@
           <a:p>
             <a:pPr lvl="0"/>
             <a:r>
-              <a:rPr kumimoji="1" lang="ja-JP" altLang="en-US" smtClean="0"/>
+              <a:rPr kumimoji="1" lang="ja-JP" altLang="en-US"/>
               <a:t>マスター テキストの書式設定</a:t>
             </a:r>
           </a:p>
           <a:p>
             <a:pPr lvl="1"/>
             <a:r>
-              <a:rPr kumimoji="1" lang="ja-JP" altLang="en-US" smtClean="0"/>
+              <a:rPr kumimoji="1" lang="ja-JP" altLang="en-US"/>
               <a:t>第 </a:t>
             </a:r>
             <a:r>
-              <a:rPr kumimoji="1" lang="en-US" altLang="ja-JP" smtClean="0"/>
+              <a:rPr kumimoji="1" lang="en-US" altLang="ja-JP"/>
               <a:t>2 </a:t>
             </a:r>
             <a:r>
-              <a:rPr kumimoji="1" lang="ja-JP" altLang="en-US" smtClean="0"/>
+              <a:rPr kumimoji="1" lang="ja-JP" altLang="en-US"/>
               <a:t>レベル</a:t>
             </a:r>
           </a:p>
           <a:p>
             <a:pPr lvl="2"/>
             <a:r>
-              <a:rPr kumimoji="1" lang="ja-JP" altLang="en-US" smtClean="0"/>
+              <a:rPr kumimoji="1" lang="ja-JP" altLang="en-US"/>
               <a:t>第 </a:t>
             </a:r>
             <a:r>
-              <a:rPr kumimoji="1" lang="en-US" altLang="ja-JP" smtClean="0"/>
+              <a:rPr kumimoji="1" lang="en-US" altLang="ja-JP"/>
               <a:t>3 </a:t>
             </a:r>
             <a:r>
-              <a:rPr kumimoji="1" lang="ja-JP" altLang="en-US" smtClean="0"/>
+              <a:rPr kumimoji="1" lang="ja-JP" altLang="en-US"/>
               <a:t>レベル</a:t>
             </a:r>
           </a:p>
           <a:p>
             <a:pPr lvl="3"/>
             <a:r>
-              <a:rPr kumimoji="1" lang="ja-JP" altLang="en-US" smtClean="0"/>
+              <a:rPr kumimoji="1" lang="ja-JP" altLang="en-US"/>
               <a:t>第 </a:t>
             </a:r>
             <a:r>
-              <a:rPr kumimoji="1" lang="en-US" altLang="ja-JP" smtClean="0"/>
+              <a:rPr kumimoji="1" lang="en-US" altLang="ja-JP"/>
               <a:t>4 </a:t>
             </a:r>
             <a:r>
-              <a:rPr kumimoji="1" lang="ja-JP" altLang="en-US" smtClean="0"/>
+              <a:rPr kumimoji="1" lang="ja-JP" altLang="en-US"/>
               <a:t>レベル</a:t>
             </a:r>
           </a:p>
           <a:p>
             <a:pPr lvl="4"/>
             <a:r>
-              <a:rPr kumimoji="1" lang="ja-JP" altLang="en-US" smtClean="0"/>
+              <a:rPr kumimoji="1" lang="ja-JP" altLang="en-US"/>
               <a:t>第 </a:t>
             </a:r>
             <a:r>
-              <a:rPr kumimoji="1" lang="en-US" altLang="ja-JP" smtClean="0"/>
+              <a:rPr kumimoji="1" lang="en-US" altLang="ja-JP"/>
               <a:t>5 </a:t>
             </a:r>
             <a:r>
-              <a:rPr kumimoji="1" lang="ja-JP" altLang="en-US" smtClean="0"/>
+              <a:rPr kumimoji="1" lang="ja-JP" altLang="en-US"/>
               <a:t>レベル</a:t>
             </a:r>
-            <a:endParaRPr kumimoji="1" lang="ja-JP" altLang="en-US"/>
           </a:p>
         </p:txBody>
       </p:sp>
@@ -445,7 +454,7 @@
           <a:p>
             <a:fld id="{F810C2E4-AF92-4DDE-9263-A529A69366F4}" type="datetimeFigureOut">
               <a:rPr kumimoji="1" lang="ja-JP" altLang="en-US" smtClean="0"/>
-              <a:t>2020/1/10</a:t>
+              <a:t>2021/11/18</a:t>
             </a:fld>
             <a:endParaRPr kumimoji="1" lang="ja-JP" altLang="en-US"/>
           </a:p>
@@ -544,10 +553,9 @@
           <a:lstStyle/>
           <a:p>
             <a:r>
-              <a:rPr kumimoji="1" lang="ja-JP" altLang="en-US" smtClean="0"/>
+              <a:rPr kumimoji="1" lang="ja-JP" altLang="en-US"/>
               <a:t>マスター タイトルの書式設定</a:t>
             </a:r>
-            <a:endParaRPr kumimoji="1" lang="ja-JP" altLang="en-US"/>
           </a:p>
         </p:txBody>
       </p:sp>
@@ -573,70 +581,69 @@
           <a:p>
             <a:pPr lvl="0"/>
             <a:r>
-              <a:rPr kumimoji="1" lang="ja-JP" altLang="en-US" smtClean="0"/>
+              <a:rPr kumimoji="1" lang="ja-JP" altLang="en-US"/>
               <a:t>マスター テキストの書式設定</a:t>
             </a:r>
           </a:p>
           <a:p>
             <a:pPr lvl="1"/>
             <a:r>
-              <a:rPr kumimoji="1" lang="ja-JP" altLang="en-US" smtClean="0"/>
+              <a:rPr kumimoji="1" lang="ja-JP" altLang="en-US"/>
               <a:t>第 </a:t>
             </a:r>
             <a:r>
-              <a:rPr kumimoji="1" lang="en-US" altLang="ja-JP" smtClean="0"/>
+              <a:rPr kumimoji="1" lang="en-US" altLang="ja-JP"/>
               <a:t>2 </a:t>
             </a:r>
             <a:r>
-              <a:rPr kumimoji="1" lang="ja-JP" altLang="en-US" smtClean="0"/>
+              <a:rPr kumimoji="1" lang="ja-JP" altLang="en-US"/>
               <a:t>レベル</a:t>
             </a:r>
           </a:p>
           <a:p>
             <a:pPr lvl="2"/>
             <a:r>
-              <a:rPr kumimoji="1" lang="ja-JP" altLang="en-US" smtClean="0"/>
+              <a:rPr kumimoji="1" lang="ja-JP" altLang="en-US"/>
               <a:t>第 </a:t>
             </a:r>
             <a:r>
-              <a:rPr kumimoji="1" lang="en-US" altLang="ja-JP" smtClean="0"/>
+              <a:rPr kumimoji="1" lang="en-US" altLang="ja-JP"/>
               <a:t>3 </a:t>
             </a:r>
             <a:r>
-              <a:rPr kumimoji="1" lang="ja-JP" altLang="en-US" smtClean="0"/>
+              <a:rPr kumimoji="1" lang="ja-JP" altLang="en-US"/>
               <a:t>レベル</a:t>
             </a:r>
           </a:p>
           <a:p>
             <a:pPr lvl="3"/>
             <a:r>
-              <a:rPr kumimoji="1" lang="ja-JP" altLang="en-US" smtClean="0"/>
+              <a:rPr kumimoji="1" lang="ja-JP" altLang="en-US"/>
               <a:t>第 </a:t>
             </a:r>
             <a:r>
-              <a:rPr kumimoji="1" lang="en-US" altLang="ja-JP" smtClean="0"/>
+              <a:rPr kumimoji="1" lang="en-US" altLang="ja-JP"/>
               <a:t>4 </a:t>
             </a:r>
             <a:r>
-              <a:rPr kumimoji="1" lang="ja-JP" altLang="en-US" smtClean="0"/>
+              <a:rPr kumimoji="1" lang="ja-JP" altLang="en-US"/>
               <a:t>レベル</a:t>
             </a:r>
           </a:p>
           <a:p>
             <a:pPr lvl="4"/>
             <a:r>
-              <a:rPr kumimoji="1" lang="ja-JP" altLang="en-US" smtClean="0"/>
+              <a:rPr kumimoji="1" lang="ja-JP" altLang="en-US"/>
               <a:t>第 </a:t>
             </a:r>
             <a:r>
-              <a:rPr kumimoji="1" lang="en-US" altLang="ja-JP" smtClean="0"/>
+              <a:rPr kumimoji="1" lang="en-US" altLang="ja-JP"/>
               <a:t>5 </a:t>
             </a:r>
             <a:r>
-              <a:rPr kumimoji="1" lang="ja-JP" altLang="en-US" smtClean="0"/>
+              <a:rPr kumimoji="1" lang="ja-JP" altLang="en-US"/>
               <a:t>レベル</a:t>
             </a:r>
-            <a:endParaRPr kumimoji="1" lang="ja-JP" altLang="en-US"/>
           </a:p>
         </p:txBody>
       </p:sp>
@@ -657,7 +664,7 @@
           <a:p>
             <a:fld id="{F810C2E4-AF92-4DDE-9263-A529A69366F4}" type="datetimeFigureOut">
               <a:rPr kumimoji="1" lang="ja-JP" altLang="en-US" smtClean="0"/>
-              <a:t>2020/1/10</a:t>
+              <a:t>2021/11/18</a:t>
             </a:fld>
             <a:endParaRPr kumimoji="1" lang="ja-JP" altLang="en-US"/>
           </a:p>
@@ -751,10 +758,9 @@
           <a:lstStyle/>
           <a:p>
             <a:r>
-              <a:rPr kumimoji="1" lang="ja-JP" altLang="en-US" smtClean="0"/>
+              <a:rPr kumimoji="1" lang="ja-JP" altLang="en-US"/>
               <a:t>マスター タイトルの書式設定</a:t>
             </a:r>
-            <a:endParaRPr kumimoji="1" lang="ja-JP" altLang="en-US"/>
           </a:p>
         </p:txBody>
       </p:sp>
@@ -775,70 +781,69 @@
           <a:p>
             <a:pPr lvl="0"/>
             <a:r>
-              <a:rPr kumimoji="1" lang="ja-JP" altLang="en-US" smtClean="0"/>
+              <a:rPr kumimoji="1" lang="ja-JP" altLang="en-US"/>
               <a:t>マスター テキストの書式設定</a:t>
             </a:r>
           </a:p>
           <a:p>
             <a:pPr lvl="1"/>
             <a:r>
-              <a:rPr kumimoji="1" lang="ja-JP" altLang="en-US" smtClean="0"/>
+              <a:rPr kumimoji="1" lang="ja-JP" altLang="en-US"/>
               <a:t>第 </a:t>
             </a:r>
             <a:r>
-              <a:rPr kumimoji="1" lang="en-US" altLang="ja-JP" smtClean="0"/>
+              <a:rPr kumimoji="1" lang="en-US" altLang="ja-JP"/>
               <a:t>2 </a:t>
             </a:r>
             <a:r>
-              <a:rPr kumimoji="1" lang="ja-JP" altLang="en-US" smtClean="0"/>
+              <a:rPr kumimoji="1" lang="ja-JP" altLang="en-US"/>
               <a:t>レベル</a:t>
             </a:r>
           </a:p>
           <a:p>
             <a:pPr lvl="2"/>
             <a:r>
-              <a:rPr kumimoji="1" lang="ja-JP" altLang="en-US" smtClean="0"/>
+              <a:rPr kumimoji="1" lang="ja-JP" altLang="en-US"/>
               <a:t>第 </a:t>
             </a:r>
             <a:r>
-              <a:rPr kumimoji="1" lang="en-US" altLang="ja-JP" smtClean="0"/>
+              <a:rPr kumimoji="1" lang="en-US" altLang="ja-JP"/>
               <a:t>3 </a:t>
             </a:r>
             <a:r>
-              <a:rPr kumimoji="1" lang="ja-JP" altLang="en-US" smtClean="0"/>
+              <a:rPr kumimoji="1" lang="ja-JP" altLang="en-US"/>
               <a:t>レベル</a:t>
             </a:r>
           </a:p>
           <a:p>
             <a:pPr lvl="3"/>
             <a:r>
-              <a:rPr kumimoji="1" lang="ja-JP" altLang="en-US" smtClean="0"/>
+              <a:rPr kumimoji="1" lang="ja-JP" altLang="en-US"/>
               <a:t>第 </a:t>
             </a:r>
             <a:r>
-              <a:rPr kumimoji="1" lang="en-US" altLang="ja-JP" smtClean="0"/>
+              <a:rPr kumimoji="1" lang="en-US" altLang="ja-JP"/>
               <a:t>4 </a:t>
             </a:r>
             <a:r>
-              <a:rPr kumimoji="1" lang="ja-JP" altLang="en-US" smtClean="0"/>
+              <a:rPr kumimoji="1" lang="ja-JP" altLang="en-US"/>
               <a:t>レベル</a:t>
             </a:r>
           </a:p>
           <a:p>
             <a:pPr lvl="4"/>
             <a:r>
-              <a:rPr kumimoji="1" lang="ja-JP" altLang="en-US" smtClean="0"/>
+              <a:rPr kumimoji="1" lang="ja-JP" altLang="en-US"/>
               <a:t>第 </a:t>
             </a:r>
             <a:r>
-              <a:rPr kumimoji="1" lang="en-US" altLang="ja-JP" smtClean="0"/>
+              <a:rPr kumimoji="1" lang="en-US" altLang="ja-JP"/>
               <a:t>5 </a:t>
             </a:r>
             <a:r>
-              <a:rPr kumimoji="1" lang="ja-JP" altLang="en-US" smtClean="0"/>
+              <a:rPr kumimoji="1" lang="ja-JP" altLang="en-US"/>
               <a:t>レベル</a:t>
             </a:r>
-            <a:endParaRPr kumimoji="1" lang="ja-JP" altLang="en-US"/>
           </a:p>
         </p:txBody>
       </p:sp>
@@ -859,7 +864,7 @@
           <a:p>
             <a:fld id="{F810C2E4-AF92-4DDE-9263-A529A69366F4}" type="datetimeFigureOut">
               <a:rPr kumimoji="1" lang="ja-JP" altLang="en-US" smtClean="0"/>
-              <a:t>2020/1/10</a:t>
+              <a:t>2021/11/18</a:t>
             </a:fld>
             <a:endParaRPr kumimoji="1" lang="ja-JP" altLang="en-US"/>
           </a:p>
@@ -962,10 +967,9 @@
           </a:lstStyle>
           <a:p>
             <a:r>
-              <a:rPr kumimoji="1" lang="ja-JP" altLang="en-US" smtClean="0"/>
+              <a:rPr kumimoji="1" lang="ja-JP" altLang="en-US"/>
               <a:t>マスター タイトルの書式設定</a:t>
             </a:r>
-            <a:endParaRPr kumimoji="1" lang="ja-JP" altLang="en-US"/>
           </a:p>
         </p:txBody>
       </p:sp>
@@ -1082,7 +1086,7 @@
           <a:p>
             <a:pPr lvl="0"/>
             <a:r>
-              <a:rPr kumimoji="1" lang="ja-JP" altLang="en-US" smtClean="0"/>
+              <a:rPr kumimoji="1" lang="ja-JP" altLang="en-US"/>
               <a:t>マスター テキストの書式設定</a:t>
             </a:r>
           </a:p>
@@ -1105,7 +1109,7 @@
           <a:p>
             <a:fld id="{F810C2E4-AF92-4DDE-9263-A529A69366F4}" type="datetimeFigureOut">
               <a:rPr kumimoji="1" lang="ja-JP" altLang="en-US" smtClean="0"/>
-              <a:t>2020/1/10</a:t>
+              <a:t>2021/11/18</a:t>
             </a:fld>
             <a:endParaRPr kumimoji="1" lang="ja-JP" altLang="en-US"/>
           </a:p>
@@ -1199,10 +1203,9 @@
           <a:lstStyle/>
           <a:p>
             <a:r>
-              <a:rPr kumimoji="1" lang="ja-JP" altLang="en-US" smtClean="0"/>
+              <a:rPr kumimoji="1" lang="ja-JP" altLang="en-US"/>
               <a:t>マスター タイトルの書式設定</a:t>
             </a:r>
-            <a:endParaRPr kumimoji="1" lang="ja-JP" altLang="en-US"/>
           </a:p>
         </p:txBody>
       </p:sp>
@@ -1228,70 +1231,69 @@
           <a:p>
             <a:pPr lvl="0"/>
             <a:r>
-              <a:rPr kumimoji="1" lang="ja-JP" altLang="en-US" smtClean="0"/>
+              <a:rPr kumimoji="1" lang="ja-JP" altLang="en-US"/>
               <a:t>マスター テキストの書式設定</a:t>
             </a:r>
           </a:p>
           <a:p>
             <a:pPr lvl="1"/>
             <a:r>
-              <a:rPr kumimoji="1" lang="ja-JP" altLang="en-US" smtClean="0"/>
+              <a:rPr kumimoji="1" lang="ja-JP" altLang="en-US"/>
               <a:t>第 </a:t>
             </a:r>
             <a:r>
-              <a:rPr kumimoji="1" lang="en-US" altLang="ja-JP" smtClean="0"/>
+              <a:rPr kumimoji="1" lang="en-US" altLang="ja-JP"/>
               <a:t>2 </a:t>
             </a:r>
             <a:r>
-              <a:rPr kumimoji="1" lang="ja-JP" altLang="en-US" smtClean="0"/>
+              <a:rPr kumimoji="1" lang="ja-JP" altLang="en-US"/>
               <a:t>レベル</a:t>
             </a:r>
           </a:p>
           <a:p>
             <a:pPr lvl="2"/>
             <a:r>
-              <a:rPr kumimoji="1" lang="ja-JP" altLang="en-US" smtClean="0"/>
+              <a:rPr kumimoji="1" lang="ja-JP" altLang="en-US"/>
               <a:t>第 </a:t>
             </a:r>
             <a:r>
-              <a:rPr kumimoji="1" lang="en-US" altLang="ja-JP" smtClean="0"/>
+              <a:rPr kumimoji="1" lang="en-US" altLang="ja-JP"/>
               <a:t>3 </a:t>
             </a:r>
             <a:r>
-              <a:rPr kumimoji="1" lang="ja-JP" altLang="en-US" smtClean="0"/>
+              <a:rPr kumimoji="1" lang="ja-JP" altLang="en-US"/>
               <a:t>レベル</a:t>
             </a:r>
           </a:p>
           <a:p>
             <a:pPr lvl="3"/>
             <a:r>
-              <a:rPr kumimoji="1" lang="ja-JP" altLang="en-US" smtClean="0"/>
+              <a:rPr kumimoji="1" lang="ja-JP" altLang="en-US"/>
               <a:t>第 </a:t>
             </a:r>
             <a:r>
-              <a:rPr kumimoji="1" lang="en-US" altLang="ja-JP" smtClean="0"/>
+              <a:rPr kumimoji="1" lang="en-US" altLang="ja-JP"/>
               <a:t>4 </a:t>
             </a:r>
             <a:r>
-              <a:rPr kumimoji="1" lang="ja-JP" altLang="en-US" smtClean="0"/>
+              <a:rPr kumimoji="1" lang="ja-JP" altLang="en-US"/>
               <a:t>レベル</a:t>
             </a:r>
           </a:p>
           <a:p>
             <a:pPr lvl="4"/>
             <a:r>
-              <a:rPr kumimoji="1" lang="ja-JP" altLang="en-US" smtClean="0"/>
+              <a:rPr kumimoji="1" lang="ja-JP" altLang="en-US"/>
               <a:t>第 </a:t>
             </a:r>
             <a:r>
-              <a:rPr kumimoji="1" lang="en-US" altLang="ja-JP" smtClean="0"/>
+              <a:rPr kumimoji="1" lang="en-US" altLang="ja-JP"/>
               <a:t>5 </a:t>
             </a:r>
             <a:r>
-              <a:rPr kumimoji="1" lang="ja-JP" altLang="en-US" smtClean="0"/>
+              <a:rPr kumimoji="1" lang="ja-JP" altLang="en-US"/>
               <a:t>レベル</a:t>
             </a:r>
-            <a:endParaRPr kumimoji="1" lang="ja-JP" altLang="en-US"/>
           </a:p>
         </p:txBody>
       </p:sp>
@@ -1317,70 +1319,69 @@
           <a:p>
             <a:pPr lvl="0"/>
             <a:r>
-              <a:rPr kumimoji="1" lang="ja-JP" altLang="en-US" smtClean="0"/>
+              <a:rPr kumimoji="1" lang="ja-JP" altLang="en-US"/>
               <a:t>マスター テキストの書式設定</a:t>
             </a:r>
           </a:p>
           <a:p>
             <a:pPr lvl="1"/>
             <a:r>
-              <a:rPr kumimoji="1" lang="ja-JP" altLang="en-US" smtClean="0"/>
+              <a:rPr kumimoji="1" lang="ja-JP" altLang="en-US"/>
               <a:t>第 </a:t>
             </a:r>
             <a:r>
-              <a:rPr kumimoji="1" lang="en-US" altLang="ja-JP" smtClean="0"/>
+              <a:rPr kumimoji="1" lang="en-US" altLang="ja-JP"/>
               <a:t>2 </a:t>
             </a:r>
             <a:r>
-              <a:rPr kumimoji="1" lang="ja-JP" altLang="en-US" smtClean="0"/>
+              <a:rPr kumimoji="1" lang="ja-JP" altLang="en-US"/>
               <a:t>レベル</a:t>
             </a:r>
           </a:p>
           <a:p>
             <a:pPr lvl="2"/>
             <a:r>
-              <a:rPr kumimoji="1" lang="ja-JP" altLang="en-US" smtClean="0"/>
+              <a:rPr kumimoji="1" lang="ja-JP" altLang="en-US"/>
               <a:t>第 </a:t>
             </a:r>
             <a:r>
-              <a:rPr kumimoji="1" lang="en-US" altLang="ja-JP" smtClean="0"/>
+              <a:rPr kumimoji="1" lang="en-US" altLang="ja-JP"/>
               <a:t>3 </a:t>
             </a:r>
             <a:r>
-              <a:rPr kumimoji="1" lang="ja-JP" altLang="en-US" smtClean="0"/>
+              <a:rPr kumimoji="1" lang="ja-JP" altLang="en-US"/>
               <a:t>レベル</a:t>
             </a:r>
           </a:p>
           <a:p>
             <a:pPr lvl="3"/>
             <a:r>
-              <a:rPr kumimoji="1" lang="ja-JP" altLang="en-US" smtClean="0"/>
+              <a:rPr kumimoji="1" lang="ja-JP" altLang="en-US"/>
               <a:t>第 </a:t>
             </a:r>
             <a:r>
-              <a:rPr kumimoji="1" lang="en-US" altLang="ja-JP" smtClean="0"/>
+              <a:rPr kumimoji="1" lang="en-US" altLang="ja-JP"/>
               <a:t>4 </a:t>
             </a:r>
             <a:r>
-              <a:rPr kumimoji="1" lang="ja-JP" altLang="en-US" smtClean="0"/>
+              <a:rPr kumimoji="1" lang="ja-JP" altLang="en-US"/>
               <a:t>レベル</a:t>
             </a:r>
           </a:p>
           <a:p>
             <a:pPr lvl="4"/>
             <a:r>
-              <a:rPr kumimoji="1" lang="ja-JP" altLang="en-US" smtClean="0"/>
+              <a:rPr kumimoji="1" lang="ja-JP" altLang="en-US"/>
               <a:t>第 </a:t>
             </a:r>
             <a:r>
-              <a:rPr kumimoji="1" lang="en-US" altLang="ja-JP" smtClean="0"/>
+              <a:rPr kumimoji="1" lang="en-US" altLang="ja-JP"/>
               <a:t>5 </a:t>
             </a:r>
             <a:r>
-              <a:rPr kumimoji="1" lang="ja-JP" altLang="en-US" smtClean="0"/>
+              <a:rPr kumimoji="1" lang="ja-JP" altLang="en-US"/>
               <a:t>レベル</a:t>
             </a:r>
-            <a:endParaRPr kumimoji="1" lang="ja-JP" altLang="en-US"/>
           </a:p>
         </p:txBody>
       </p:sp>
@@ -1401,7 +1402,7 @@
           <a:p>
             <a:fld id="{F810C2E4-AF92-4DDE-9263-A529A69366F4}" type="datetimeFigureOut">
               <a:rPr kumimoji="1" lang="ja-JP" altLang="en-US" smtClean="0"/>
-              <a:t>2020/1/10</a:t>
+              <a:t>2021/11/18</a:t>
             </a:fld>
             <a:endParaRPr kumimoji="1" lang="ja-JP" altLang="en-US"/>
           </a:p>
@@ -1500,10 +1501,9 @@
           <a:lstStyle/>
           <a:p>
             <a:r>
-              <a:rPr kumimoji="1" lang="ja-JP" altLang="en-US" smtClean="0"/>
+              <a:rPr kumimoji="1" lang="ja-JP" altLang="en-US"/>
               <a:t>マスター タイトルの書式設定</a:t>
             </a:r>
-            <a:endParaRPr kumimoji="1" lang="ja-JP" altLang="en-US"/>
           </a:p>
         </p:txBody>
       </p:sp>
@@ -1566,7 +1566,7 @@
           <a:p>
             <a:pPr lvl="0"/>
             <a:r>
-              <a:rPr kumimoji="1" lang="ja-JP" altLang="en-US" smtClean="0"/>
+              <a:rPr kumimoji="1" lang="ja-JP" altLang="en-US"/>
               <a:t>マスター テキストの書式設定</a:t>
             </a:r>
           </a:p>
@@ -1594,70 +1594,69 @@
           <a:p>
             <a:pPr lvl="0"/>
             <a:r>
-              <a:rPr kumimoji="1" lang="ja-JP" altLang="en-US" smtClean="0"/>
+              <a:rPr kumimoji="1" lang="ja-JP" altLang="en-US"/>
               <a:t>マスター テキストの書式設定</a:t>
             </a:r>
           </a:p>
           <a:p>
             <a:pPr lvl="1"/>
             <a:r>
-              <a:rPr kumimoji="1" lang="ja-JP" altLang="en-US" smtClean="0"/>
+              <a:rPr kumimoji="1" lang="ja-JP" altLang="en-US"/>
               <a:t>第 </a:t>
             </a:r>
             <a:r>
-              <a:rPr kumimoji="1" lang="en-US" altLang="ja-JP" smtClean="0"/>
+              <a:rPr kumimoji="1" lang="en-US" altLang="ja-JP"/>
               <a:t>2 </a:t>
             </a:r>
             <a:r>
-              <a:rPr kumimoji="1" lang="ja-JP" altLang="en-US" smtClean="0"/>
+              <a:rPr kumimoji="1" lang="ja-JP" altLang="en-US"/>
               <a:t>レベル</a:t>
             </a:r>
           </a:p>
           <a:p>
             <a:pPr lvl="2"/>
             <a:r>
-              <a:rPr kumimoji="1" lang="ja-JP" altLang="en-US" smtClean="0"/>
+              <a:rPr kumimoji="1" lang="ja-JP" altLang="en-US"/>
               <a:t>第 </a:t>
             </a:r>
             <a:r>
-              <a:rPr kumimoji="1" lang="en-US" altLang="ja-JP" smtClean="0"/>
+              <a:rPr kumimoji="1" lang="en-US" altLang="ja-JP"/>
               <a:t>3 </a:t>
             </a:r>
             <a:r>
-              <a:rPr kumimoji="1" lang="ja-JP" altLang="en-US" smtClean="0"/>
+              <a:rPr kumimoji="1" lang="ja-JP" altLang="en-US"/>
               <a:t>レベル</a:t>
             </a:r>
           </a:p>
           <a:p>
             <a:pPr lvl="3"/>
             <a:r>
-              <a:rPr kumimoji="1" lang="ja-JP" altLang="en-US" smtClean="0"/>
+              <a:rPr kumimoji="1" lang="ja-JP" altLang="en-US"/>
               <a:t>第 </a:t>
             </a:r>
             <a:r>
-              <a:rPr kumimoji="1" lang="en-US" altLang="ja-JP" smtClean="0"/>
+              <a:rPr kumimoji="1" lang="en-US" altLang="ja-JP"/>
               <a:t>4 </a:t>
             </a:r>
             <a:r>
-              <a:rPr kumimoji="1" lang="ja-JP" altLang="en-US" smtClean="0"/>
+              <a:rPr kumimoji="1" lang="ja-JP" altLang="en-US"/>
               <a:t>レベル</a:t>
             </a:r>
           </a:p>
           <a:p>
             <a:pPr lvl="4"/>
             <a:r>
-              <a:rPr kumimoji="1" lang="ja-JP" altLang="en-US" smtClean="0"/>
+              <a:rPr kumimoji="1" lang="ja-JP" altLang="en-US"/>
               <a:t>第 </a:t>
             </a:r>
             <a:r>
-              <a:rPr kumimoji="1" lang="en-US" altLang="ja-JP" smtClean="0"/>
+              <a:rPr kumimoji="1" lang="en-US" altLang="ja-JP"/>
               <a:t>5 </a:t>
             </a:r>
             <a:r>
-              <a:rPr kumimoji="1" lang="ja-JP" altLang="en-US" smtClean="0"/>
+              <a:rPr kumimoji="1" lang="ja-JP" altLang="en-US"/>
               <a:t>レベル</a:t>
             </a:r>
-            <a:endParaRPr kumimoji="1" lang="ja-JP" altLang="en-US"/>
           </a:p>
         </p:txBody>
       </p:sp>
@@ -1720,7 +1719,7 @@
           <a:p>
             <a:pPr lvl="0"/>
             <a:r>
-              <a:rPr kumimoji="1" lang="ja-JP" altLang="en-US" smtClean="0"/>
+              <a:rPr kumimoji="1" lang="ja-JP" altLang="en-US"/>
               <a:t>マスター テキストの書式設定</a:t>
             </a:r>
           </a:p>
@@ -1748,70 +1747,69 @@
           <a:p>
             <a:pPr lvl="0"/>
             <a:r>
-              <a:rPr kumimoji="1" lang="ja-JP" altLang="en-US" smtClean="0"/>
+              <a:rPr kumimoji="1" lang="ja-JP" altLang="en-US"/>
               <a:t>マスター テキストの書式設定</a:t>
             </a:r>
           </a:p>
           <a:p>
             <a:pPr lvl="1"/>
             <a:r>
-              <a:rPr kumimoji="1" lang="ja-JP" altLang="en-US" smtClean="0"/>
+              <a:rPr kumimoji="1" lang="ja-JP" altLang="en-US"/>
               <a:t>第 </a:t>
             </a:r>
             <a:r>
-              <a:rPr kumimoji="1" lang="en-US" altLang="ja-JP" smtClean="0"/>
+              <a:rPr kumimoji="1" lang="en-US" altLang="ja-JP"/>
               <a:t>2 </a:t>
             </a:r>
             <a:r>
-              <a:rPr kumimoji="1" lang="ja-JP" altLang="en-US" smtClean="0"/>
+              <a:rPr kumimoji="1" lang="ja-JP" altLang="en-US"/>
               <a:t>レベル</a:t>
             </a:r>
           </a:p>
           <a:p>
             <a:pPr lvl="2"/>
             <a:r>
-              <a:rPr kumimoji="1" lang="ja-JP" altLang="en-US" smtClean="0"/>
+              <a:rPr kumimoji="1" lang="ja-JP" altLang="en-US"/>
               <a:t>第 </a:t>
             </a:r>
             <a:r>
-              <a:rPr kumimoji="1" lang="en-US" altLang="ja-JP" smtClean="0"/>
+              <a:rPr kumimoji="1" lang="en-US" altLang="ja-JP"/>
               <a:t>3 </a:t>
             </a:r>
             <a:r>
-              <a:rPr kumimoji="1" lang="ja-JP" altLang="en-US" smtClean="0"/>
+              <a:rPr kumimoji="1" lang="ja-JP" altLang="en-US"/>
               <a:t>レベル</a:t>
             </a:r>
           </a:p>
           <a:p>
             <a:pPr lvl="3"/>
             <a:r>
-              <a:rPr kumimoji="1" lang="ja-JP" altLang="en-US" smtClean="0"/>
+              <a:rPr kumimoji="1" lang="ja-JP" altLang="en-US"/>
               <a:t>第 </a:t>
             </a:r>
             <a:r>
-              <a:rPr kumimoji="1" lang="en-US" altLang="ja-JP" smtClean="0"/>
+              <a:rPr kumimoji="1" lang="en-US" altLang="ja-JP"/>
               <a:t>4 </a:t>
             </a:r>
             <a:r>
-              <a:rPr kumimoji="1" lang="ja-JP" altLang="en-US" smtClean="0"/>
+              <a:rPr kumimoji="1" lang="ja-JP" altLang="en-US"/>
               <a:t>レベル</a:t>
             </a:r>
           </a:p>
           <a:p>
             <a:pPr lvl="4"/>
             <a:r>
-              <a:rPr kumimoji="1" lang="ja-JP" altLang="en-US" smtClean="0"/>
+              <a:rPr kumimoji="1" lang="ja-JP" altLang="en-US"/>
               <a:t>第 </a:t>
             </a:r>
             <a:r>
-              <a:rPr kumimoji="1" lang="en-US" altLang="ja-JP" smtClean="0"/>
+              <a:rPr kumimoji="1" lang="en-US" altLang="ja-JP"/>
               <a:t>5 </a:t>
             </a:r>
             <a:r>
-              <a:rPr kumimoji="1" lang="ja-JP" altLang="en-US" smtClean="0"/>
+              <a:rPr kumimoji="1" lang="ja-JP" altLang="en-US"/>
               <a:t>レベル</a:t>
             </a:r>
-            <a:endParaRPr kumimoji="1" lang="ja-JP" altLang="en-US"/>
           </a:p>
         </p:txBody>
       </p:sp>
@@ -1832,7 +1830,7 @@
           <a:p>
             <a:fld id="{F810C2E4-AF92-4DDE-9263-A529A69366F4}" type="datetimeFigureOut">
               <a:rPr kumimoji="1" lang="ja-JP" altLang="en-US" smtClean="0"/>
-              <a:t>2020/1/10</a:t>
+              <a:t>2021/11/18</a:t>
             </a:fld>
             <a:endParaRPr kumimoji="1" lang="ja-JP" altLang="en-US"/>
           </a:p>
@@ -1926,10 +1924,9 @@
           <a:lstStyle/>
           <a:p>
             <a:r>
-              <a:rPr kumimoji="1" lang="ja-JP" altLang="en-US" smtClean="0"/>
+              <a:rPr kumimoji="1" lang="ja-JP" altLang="en-US"/>
               <a:t>マスター タイトルの書式設定</a:t>
             </a:r>
-            <a:endParaRPr kumimoji="1" lang="ja-JP" altLang="en-US"/>
           </a:p>
         </p:txBody>
       </p:sp>
@@ -1950,7 +1947,7 @@
           <a:p>
             <a:fld id="{F810C2E4-AF92-4DDE-9263-A529A69366F4}" type="datetimeFigureOut">
               <a:rPr kumimoji="1" lang="ja-JP" altLang="en-US" smtClean="0"/>
-              <a:t>2020/1/10</a:t>
+              <a:t>2021/11/18</a:t>
             </a:fld>
             <a:endParaRPr kumimoji="1" lang="ja-JP" altLang="en-US"/>
           </a:p>
@@ -2045,7 +2042,7 @@
           <a:p>
             <a:fld id="{F810C2E4-AF92-4DDE-9263-A529A69366F4}" type="datetimeFigureOut">
               <a:rPr kumimoji="1" lang="ja-JP" altLang="en-US" smtClean="0"/>
-              <a:t>2020/1/10</a:t>
+              <a:t>2021/11/18</a:t>
             </a:fld>
             <a:endParaRPr kumimoji="1" lang="ja-JP" altLang="en-US"/>
           </a:p>
@@ -2148,10 +2145,9 @@
           </a:lstStyle>
           <a:p>
             <a:r>
-              <a:rPr kumimoji="1" lang="ja-JP" altLang="en-US" smtClean="0"/>
+              <a:rPr kumimoji="1" lang="ja-JP" altLang="en-US"/>
               <a:t>マスター タイトルの書式設定</a:t>
             </a:r>
-            <a:endParaRPr kumimoji="1" lang="ja-JP" altLang="en-US"/>
           </a:p>
         </p:txBody>
       </p:sp>
@@ -2205,70 +2201,69 @@
           <a:p>
             <a:pPr lvl="0"/>
             <a:r>
-              <a:rPr kumimoji="1" lang="ja-JP" altLang="en-US" smtClean="0"/>
+              <a:rPr kumimoji="1" lang="ja-JP" altLang="en-US"/>
               <a:t>マスター テキストの書式設定</a:t>
             </a:r>
           </a:p>
           <a:p>
             <a:pPr lvl="1"/>
             <a:r>
-              <a:rPr kumimoji="1" lang="ja-JP" altLang="en-US" smtClean="0"/>
+              <a:rPr kumimoji="1" lang="ja-JP" altLang="en-US"/>
               <a:t>第 </a:t>
             </a:r>
             <a:r>
-              <a:rPr kumimoji="1" lang="en-US" altLang="ja-JP" smtClean="0"/>
+              <a:rPr kumimoji="1" lang="en-US" altLang="ja-JP"/>
               <a:t>2 </a:t>
             </a:r>
             <a:r>
-              <a:rPr kumimoji="1" lang="ja-JP" altLang="en-US" smtClean="0"/>
+              <a:rPr kumimoji="1" lang="ja-JP" altLang="en-US"/>
               <a:t>レベル</a:t>
             </a:r>
           </a:p>
           <a:p>
             <a:pPr lvl="2"/>
             <a:r>
-              <a:rPr kumimoji="1" lang="ja-JP" altLang="en-US" smtClean="0"/>
+              <a:rPr kumimoji="1" lang="ja-JP" altLang="en-US"/>
               <a:t>第 </a:t>
             </a:r>
             <a:r>
-              <a:rPr kumimoji="1" lang="en-US" altLang="ja-JP" smtClean="0"/>
+              <a:rPr kumimoji="1" lang="en-US" altLang="ja-JP"/>
               <a:t>3 </a:t>
             </a:r>
             <a:r>
-              <a:rPr kumimoji="1" lang="ja-JP" altLang="en-US" smtClean="0"/>
+              <a:rPr kumimoji="1" lang="ja-JP" altLang="en-US"/>
               <a:t>レベル</a:t>
             </a:r>
           </a:p>
           <a:p>
             <a:pPr lvl="3"/>
             <a:r>
-              <a:rPr kumimoji="1" lang="ja-JP" altLang="en-US" smtClean="0"/>
+              <a:rPr kumimoji="1" lang="ja-JP" altLang="en-US"/>
               <a:t>第 </a:t>
             </a:r>
             <a:r>
-              <a:rPr kumimoji="1" lang="en-US" altLang="ja-JP" smtClean="0"/>
+              <a:rPr kumimoji="1" lang="en-US" altLang="ja-JP"/>
               <a:t>4 </a:t>
             </a:r>
             <a:r>
-              <a:rPr kumimoji="1" lang="ja-JP" altLang="en-US" smtClean="0"/>
+              <a:rPr kumimoji="1" lang="ja-JP" altLang="en-US"/>
               <a:t>レベル</a:t>
             </a:r>
           </a:p>
           <a:p>
             <a:pPr lvl="4"/>
             <a:r>
-              <a:rPr kumimoji="1" lang="ja-JP" altLang="en-US" smtClean="0"/>
+              <a:rPr kumimoji="1" lang="ja-JP" altLang="en-US"/>
               <a:t>第 </a:t>
             </a:r>
             <a:r>
-              <a:rPr kumimoji="1" lang="en-US" altLang="ja-JP" smtClean="0"/>
+              <a:rPr kumimoji="1" lang="en-US" altLang="ja-JP"/>
               <a:t>5 </a:t>
             </a:r>
             <a:r>
-              <a:rPr kumimoji="1" lang="ja-JP" altLang="en-US" smtClean="0"/>
+              <a:rPr kumimoji="1" lang="ja-JP" altLang="en-US"/>
               <a:t>レベル</a:t>
             </a:r>
-            <a:endParaRPr kumimoji="1" lang="ja-JP" altLang="en-US"/>
           </a:p>
         </p:txBody>
       </p:sp>
@@ -2331,7 +2326,7 @@
           <a:p>
             <a:pPr lvl="0"/>
             <a:r>
-              <a:rPr kumimoji="1" lang="ja-JP" altLang="en-US" smtClean="0"/>
+              <a:rPr kumimoji="1" lang="ja-JP" altLang="en-US"/>
               <a:t>マスター テキストの書式設定</a:t>
             </a:r>
           </a:p>
@@ -2354,7 +2349,7 @@
           <a:p>
             <a:fld id="{F810C2E4-AF92-4DDE-9263-A529A69366F4}" type="datetimeFigureOut">
               <a:rPr kumimoji="1" lang="ja-JP" altLang="en-US" smtClean="0"/>
-              <a:t>2020/1/10</a:t>
+              <a:t>2021/11/18</a:t>
             </a:fld>
             <a:endParaRPr kumimoji="1" lang="ja-JP" altLang="en-US"/>
           </a:p>
@@ -2457,10 +2452,9 @@
           </a:lstStyle>
           <a:p>
             <a:r>
-              <a:rPr kumimoji="1" lang="ja-JP" altLang="en-US" smtClean="0"/>
+              <a:rPr kumimoji="1" lang="ja-JP" altLang="en-US"/>
               <a:t>マスター タイトルの書式設定</a:t>
             </a:r>
-            <a:endParaRPr kumimoji="1" lang="ja-JP" altLang="en-US"/>
           </a:p>
         </p:txBody>
       </p:sp>
@@ -2584,7 +2578,7 @@
           <a:p>
             <a:pPr lvl="0"/>
             <a:r>
-              <a:rPr kumimoji="1" lang="ja-JP" altLang="en-US" smtClean="0"/>
+              <a:rPr kumimoji="1" lang="ja-JP" altLang="en-US"/>
               <a:t>マスター テキストの書式設定</a:t>
             </a:r>
           </a:p>
@@ -2607,7 +2601,7 @@
           <a:p>
             <a:fld id="{F810C2E4-AF92-4DDE-9263-A529A69366F4}" type="datetimeFigureOut">
               <a:rPr kumimoji="1" lang="ja-JP" altLang="en-US" smtClean="0"/>
-              <a:t>2020/1/10</a:t>
+              <a:t>2021/11/18</a:t>
             </a:fld>
             <a:endParaRPr kumimoji="1" lang="ja-JP" altLang="en-US"/>
           </a:p>
@@ -2716,10 +2710,9 @@
           <a:lstStyle/>
           <a:p>
             <a:r>
-              <a:rPr kumimoji="1" lang="ja-JP" altLang="en-US" smtClean="0"/>
+              <a:rPr kumimoji="1" lang="ja-JP" altLang="en-US"/>
               <a:t>マスター タイトルの書式設定</a:t>
             </a:r>
-            <a:endParaRPr kumimoji="1" lang="ja-JP" altLang="en-US"/>
           </a:p>
         </p:txBody>
       </p:sp>
@@ -2750,70 +2743,69 @@
           <a:p>
             <a:pPr lvl="0"/>
             <a:r>
-              <a:rPr kumimoji="1" lang="ja-JP" altLang="en-US" smtClean="0"/>
+              <a:rPr kumimoji="1" lang="ja-JP" altLang="en-US"/>
               <a:t>マスター テキストの書式設定</a:t>
             </a:r>
           </a:p>
           <a:p>
             <a:pPr lvl="1"/>
             <a:r>
-              <a:rPr kumimoji="1" lang="ja-JP" altLang="en-US" smtClean="0"/>
+              <a:rPr kumimoji="1" lang="ja-JP" altLang="en-US"/>
               <a:t>第 </a:t>
             </a:r>
             <a:r>
-              <a:rPr kumimoji="1" lang="en-US" altLang="ja-JP" smtClean="0"/>
+              <a:rPr kumimoji="1" lang="en-US" altLang="ja-JP"/>
               <a:t>2 </a:t>
             </a:r>
             <a:r>
-              <a:rPr kumimoji="1" lang="ja-JP" altLang="en-US" smtClean="0"/>
+              <a:rPr kumimoji="1" lang="ja-JP" altLang="en-US"/>
               <a:t>レベル</a:t>
             </a:r>
           </a:p>
           <a:p>
             <a:pPr lvl="2"/>
             <a:r>
-              <a:rPr kumimoji="1" lang="ja-JP" altLang="en-US" smtClean="0"/>
+              <a:rPr kumimoji="1" lang="ja-JP" altLang="en-US"/>
               <a:t>第 </a:t>
             </a:r>
             <a:r>
-              <a:rPr kumimoji="1" lang="en-US" altLang="ja-JP" smtClean="0"/>
+              <a:rPr kumimoji="1" lang="en-US" altLang="ja-JP"/>
               <a:t>3 </a:t>
             </a:r>
             <a:r>
-              <a:rPr kumimoji="1" lang="ja-JP" altLang="en-US" smtClean="0"/>
+              <a:rPr kumimoji="1" lang="ja-JP" altLang="en-US"/>
               <a:t>レベル</a:t>
             </a:r>
           </a:p>
           <a:p>
             <a:pPr lvl="3"/>
             <a:r>
-              <a:rPr kumimoji="1" lang="ja-JP" altLang="en-US" smtClean="0"/>
+              <a:rPr kumimoji="1" lang="ja-JP" altLang="en-US"/>
               <a:t>第 </a:t>
             </a:r>
             <a:r>
-              <a:rPr kumimoji="1" lang="en-US" altLang="ja-JP" smtClean="0"/>
+              <a:rPr kumimoji="1" lang="en-US" altLang="ja-JP"/>
               <a:t>4 </a:t>
             </a:r>
             <a:r>
-              <a:rPr kumimoji="1" lang="ja-JP" altLang="en-US" smtClean="0"/>
+              <a:rPr kumimoji="1" lang="ja-JP" altLang="en-US"/>
               <a:t>レベル</a:t>
             </a:r>
           </a:p>
           <a:p>
             <a:pPr lvl="4"/>
             <a:r>
-              <a:rPr kumimoji="1" lang="ja-JP" altLang="en-US" smtClean="0"/>
+              <a:rPr kumimoji="1" lang="ja-JP" altLang="en-US"/>
               <a:t>第 </a:t>
             </a:r>
             <a:r>
-              <a:rPr kumimoji="1" lang="en-US" altLang="ja-JP" smtClean="0"/>
+              <a:rPr kumimoji="1" lang="en-US" altLang="ja-JP"/>
               <a:t>5 </a:t>
             </a:r>
             <a:r>
-              <a:rPr kumimoji="1" lang="ja-JP" altLang="en-US" smtClean="0"/>
+              <a:rPr kumimoji="1" lang="ja-JP" altLang="en-US"/>
               <a:t>レベル</a:t>
             </a:r>
-            <a:endParaRPr kumimoji="1" lang="ja-JP" altLang="en-US"/>
           </a:p>
         </p:txBody>
       </p:sp>
@@ -2852,7 +2844,7 @@
           <a:p>
             <a:fld id="{F810C2E4-AF92-4DDE-9263-A529A69366F4}" type="datetimeFigureOut">
               <a:rPr kumimoji="1" lang="ja-JP" altLang="en-US" smtClean="0"/>
-              <a:t>2020/1/10</a:t>
+              <a:t>2021/11/18</a:t>
             </a:fld>
             <a:endParaRPr kumimoji="1" lang="ja-JP" altLang="en-US"/>
           </a:p>
@@ -3636,6 +3628,380 @@
 </p:sld>
 </file>
 
+<file path=ppt/slides/slide2.xml><?xml version="1.0" encoding="utf-8"?>
+<p:sld xmlns:a="http://schemas.openxmlformats.org/drawingml/2006/main" xmlns:r="http://schemas.openxmlformats.org/officeDocument/2006/relationships" xmlns:p="http://schemas.openxmlformats.org/presentationml/2006/main">
+  <p:cSld>
+    <p:spTree>
+      <p:nvGrpSpPr>
+        <p:cNvPr id="1" name=""/>
+        <p:cNvGrpSpPr/>
+        <p:nvPr/>
+      </p:nvGrpSpPr>
+      <p:grpSpPr>
+        <a:xfrm>
+          <a:off x="0" y="0"/>
+          <a:ext cx="0" cy="0"/>
+          <a:chOff x="0" y="0"/>
+          <a:chExt cx="0" cy="0"/>
+        </a:xfrm>
+      </p:grpSpPr>
+      <p:pic>
+        <p:nvPicPr>
+          <p:cNvPr id="5" name="図 4">
+            <a:extLst>
+              <a:ext uri="{FF2B5EF4-FFF2-40B4-BE49-F238E27FC236}">
+                <a16:creationId xmlns:a16="http://schemas.microsoft.com/office/drawing/2014/main" id="{7019B806-84B9-4B21-818C-8BE143CFF511}"/>
+              </a:ext>
+            </a:extLst>
+          </p:cNvPr>
+          <p:cNvPicPr>
+            <a:picLocks noChangeAspect="1"/>
+          </p:cNvPicPr>
+          <p:nvPr/>
+        </p:nvPicPr>
+        <p:blipFill>
+          <a:blip r:embed="rId2">
+            <a:extLst>
+              <a:ext uri="{28A0092B-C50C-407E-A947-70E740481C1C}">
+                <a14:useLocalDpi xmlns:a14="http://schemas.microsoft.com/office/drawing/2010/main" val="0"/>
+              </a:ext>
+            </a:extLst>
+          </a:blip>
+          <a:stretch>
+            <a:fillRect/>
+          </a:stretch>
+        </p:blipFill>
+        <p:spPr>
+          <a:xfrm>
+            <a:off x="0" y="381000"/>
+            <a:ext cx="12192000" cy="6096000"/>
+          </a:xfrm>
+          <a:prstGeom prst="rect">
+            <a:avLst/>
+          </a:prstGeom>
+        </p:spPr>
+      </p:pic>
+      <p:sp>
+        <p:nvSpPr>
+          <p:cNvPr id="2" name="正方形/長方形 1">
+            <a:extLst>
+              <a:ext uri="{FF2B5EF4-FFF2-40B4-BE49-F238E27FC236}">
+                <a16:creationId xmlns:a16="http://schemas.microsoft.com/office/drawing/2014/main" id="{F707CC4A-D723-422C-9FCE-DEB02C507C74}"/>
+              </a:ext>
+            </a:extLst>
+          </p:cNvPr>
+          <p:cNvSpPr/>
+          <p:nvPr/>
+        </p:nvSpPr>
+        <p:spPr>
+          <a:xfrm>
+            <a:off x="0" y="381000"/>
+            <a:ext cx="12192000" cy="6096000"/>
+          </a:xfrm>
+          <a:prstGeom prst="rect">
+            <a:avLst/>
+          </a:prstGeom>
+          <a:solidFill>
+            <a:schemeClr val="bg1"/>
+          </a:solidFill>
+          <a:ln>
+            <a:noFill/>
+          </a:ln>
+        </p:spPr>
+        <p:style>
+          <a:lnRef idx="2">
+            <a:schemeClr val="accent1">
+              <a:shade val="50000"/>
+            </a:schemeClr>
+          </a:lnRef>
+          <a:fillRef idx="1">
+            <a:schemeClr val="accent1"/>
+          </a:fillRef>
+          <a:effectRef idx="0">
+            <a:schemeClr val="accent1"/>
+          </a:effectRef>
+          <a:fontRef idx="minor">
+            <a:schemeClr val="lt1"/>
+          </a:fontRef>
+        </p:style>
+        <p:txBody>
+          <a:bodyPr rtlCol="0" anchor="ctr"/>
+          <a:lstStyle/>
+          <a:p>
+            <a:pPr algn="ctr"/>
+            <a:endParaRPr kumimoji="1" lang="ja-JP" altLang="en-US"/>
+          </a:p>
+        </p:txBody>
+      </p:sp>
+      <p:pic>
+        <p:nvPicPr>
+          <p:cNvPr id="7" name="図 6">
+            <a:extLst>
+              <a:ext uri="{FF2B5EF4-FFF2-40B4-BE49-F238E27FC236}">
+                <a16:creationId xmlns:a16="http://schemas.microsoft.com/office/drawing/2014/main" id="{DB280A00-8A08-4958-B294-0A035A52BD06}"/>
+              </a:ext>
+            </a:extLst>
+          </p:cNvPr>
+          <p:cNvPicPr>
+            <a:picLocks noChangeAspect="1"/>
+          </p:cNvPicPr>
+          <p:nvPr/>
+        </p:nvPicPr>
+        <p:blipFill rotWithShape="1">
+          <a:blip r:embed="rId3" cstate="print">
+            <a:extLst>
+              <a:ext uri="{28A0092B-C50C-407E-A947-70E740481C1C}">
+                <a14:useLocalDpi xmlns:a14="http://schemas.microsoft.com/office/drawing/2010/main" val="0"/>
+              </a:ext>
+            </a:extLst>
+          </a:blip>
+          <a:srcRect b="7868"/>
+          <a:stretch/>
+        </p:blipFill>
+        <p:spPr>
+          <a:xfrm>
+            <a:off x="4345370" y="2855312"/>
+            <a:ext cx="3107852" cy="2872287"/>
+          </a:xfrm>
+          <a:prstGeom prst="rect">
+            <a:avLst/>
+          </a:prstGeom>
+        </p:spPr>
+      </p:pic>
+      <p:sp>
+        <p:nvSpPr>
+          <p:cNvPr id="9" name="テキスト ボックス 8">
+            <a:extLst>
+              <a:ext uri="{FF2B5EF4-FFF2-40B4-BE49-F238E27FC236}">
+                <a16:creationId xmlns:a16="http://schemas.microsoft.com/office/drawing/2014/main" id="{91D048C2-1D34-40AC-8820-5CE05D6A8D9B}"/>
+              </a:ext>
+            </a:extLst>
+          </p:cNvPr>
+          <p:cNvSpPr txBox="1"/>
+          <p:nvPr/>
+        </p:nvSpPr>
+        <p:spPr>
+          <a:xfrm>
+            <a:off x="850394" y="1649019"/>
+            <a:ext cx="10491212" cy="984885"/>
+          </a:xfrm>
+          <a:prstGeom prst="rect">
+            <a:avLst/>
+          </a:prstGeom>
+          <a:noFill/>
+        </p:spPr>
+        <p:txBody>
+          <a:bodyPr wrap="square" rtlCol="0">
+            <a:spAutoFit/>
+          </a:bodyPr>
+          <a:lstStyle/>
+          <a:p>
+            <a:pPr algn="ctr"/>
+            <a:r>
+              <a:rPr lang="en-US" altLang="ja-JP" sz="5800" dirty="0">
+                <a:solidFill>
+                  <a:schemeClr val="tx1">
+                    <a:lumMod val="95000"/>
+                    <a:lumOff val="5000"/>
+                  </a:schemeClr>
+                </a:solidFill>
+                <a:latin typeface="Shippori Antique B1" panose="00000500000000000000" pitchFamily="2" charset="-128"/>
+                <a:ea typeface="Shippori Antique B1" panose="00000500000000000000" pitchFamily="2" charset="-128"/>
+              </a:rPr>
+              <a:t>Open Window</a:t>
+            </a:r>
+            <a:r>
+              <a:rPr lang="ja-JP" altLang="en-US" sz="5800" dirty="0">
+                <a:solidFill>
+                  <a:schemeClr val="tx1">
+                    <a:lumMod val="95000"/>
+                    <a:lumOff val="5000"/>
+                  </a:schemeClr>
+                </a:solidFill>
+                <a:latin typeface="Shippori Antique B1" panose="00000500000000000000" pitchFamily="2" charset="-128"/>
+                <a:ea typeface="Shippori Antique B1" panose="00000500000000000000" pitchFamily="2" charset="-128"/>
+              </a:rPr>
+              <a:t> </a:t>
+            </a:r>
+            <a:r>
+              <a:rPr lang="en-US" altLang="ja-JP" sz="5800" dirty="0">
+                <a:solidFill>
+                  <a:schemeClr val="tx1">
+                    <a:lumMod val="95000"/>
+                    <a:lumOff val="5000"/>
+                  </a:schemeClr>
+                </a:solidFill>
+                <a:latin typeface="Shippori Antique B1" panose="00000500000000000000" pitchFamily="2" charset="-128"/>
+                <a:ea typeface="Shippori Antique B1" panose="00000500000000000000" pitchFamily="2" charset="-128"/>
+              </a:rPr>
+              <a:t> Tab Context</a:t>
+            </a:r>
+            <a:endParaRPr kumimoji="1" lang="ja-JP" altLang="en-US" sz="5800" dirty="0">
+              <a:solidFill>
+                <a:schemeClr val="tx1">
+                  <a:lumMod val="95000"/>
+                  <a:lumOff val="5000"/>
+                </a:schemeClr>
+              </a:solidFill>
+              <a:latin typeface="Shippori Antique B1" panose="00000500000000000000" pitchFamily="2" charset="-128"/>
+              <a:ea typeface="Shippori Antique B1" panose="00000500000000000000" pitchFamily="2" charset="-128"/>
+            </a:endParaRPr>
+          </a:p>
+        </p:txBody>
+      </p:sp>
+      <p:sp>
+        <p:nvSpPr>
+          <p:cNvPr id="10" name="正方形/長方形 9">
+            <a:extLst>
+              <a:ext uri="{FF2B5EF4-FFF2-40B4-BE49-F238E27FC236}">
+                <a16:creationId xmlns:a16="http://schemas.microsoft.com/office/drawing/2014/main" id="{90A59806-F15A-4F21-A18F-2B136B45173D}"/>
+              </a:ext>
+            </a:extLst>
+          </p:cNvPr>
+          <p:cNvSpPr/>
+          <p:nvPr/>
+        </p:nvSpPr>
+        <p:spPr>
+          <a:xfrm>
+            <a:off x="816862" y="1353312"/>
+            <a:ext cx="10558274" cy="4315968"/>
+          </a:xfrm>
+          <a:prstGeom prst="rect">
+            <a:avLst/>
+          </a:prstGeom>
+          <a:noFill/>
+          <a:ln w="76200">
+            <a:solidFill>
+              <a:srgbClr val="00CCFF"/>
+            </a:solidFill>
+          </a:ln>
+        </p:spPr>
+        <p:style>
+          <a:lnRef idx="2">
+            <a:schemeClr val="accent1">
+              <a:shade val="50000"/>
+            </a:schemeClr>
+          </a:lnRef>
+          <a:fillRef idx="1">
+            <a:schemeClr val="accent1"/>
+          </a:fillRef>
+          <a:effectRef idx="0">
+            <a:schemeClr val="accent1"/>
+          </a:effectRef>
+          <a:fontRef idx="minor">
+            <a:schemeClr val="lt1"/>
+          </a:fontRef>
+        </p:style>
+        <p:txBody>
+          <a:bodyPr rtlCol="0" anchor="ctr"/>
+          <a:lstStyle/>
+          <a:p>
+            <a:pPr algn="ctr"/>
+            <a:endParaRPr kumimoji="1" lang="ja-JP" altLang="en-US"/>
+          </a:p>
+        </p:txBody>
+      </p:sp>
+      <p:sp>
+        <p:nvSpPr>
+          <p:cNvPr id="8" name="テキスト ボックス 7">
+            <a:extLst>
+              <a:ext uri="{FF2B5EF4-FFF2-40B4-BE49-F238E27FC236}">
+                <a16:creationId xmlns:a16="http://schemas.microsoft.com/office/drawing/2014/main" id="{EC298D7B-C7CD-489F-9C78-B982E7DB1D5B}"/>
+              </a:ext>
+            </a:extLst>
+          </p:cNvPr>
+          <p:cNvSpPr txBox="1"/>
+          <p:nvPr/>
+        </p:nvSpPr>
+        <p:spPr>
+          <a:xfrm>
+            <a:off x="4831882" y="1162955"/>
+            <a:ext cx="2528232" cy="369332"/>
+          </a:xfrm>
+          <a:prstGeom prst="rect">
+            <a:avLst/>
+          </a:prstGeom>
+          <a:solidFill>
+            <a:schemeClr val="bg1"/>
+          </a:solidFill>
+        </p:spPr>
+        <p:txBody>
+          <a:bodyPr wrap="square" rtlCol="0">
+            <a:spAutoFit/>
+          </a:bodyPr>
+          <a:lstStyle/>
+          <a:p>
+            <a:pPr algn="ctr"/>
+            <a:r>
+              <a:rPr lang="en-US" altLang="ja-JP" dirty="0" err="1">
+                <a:latin typeface="Shippori Antique B1" panose="00000500000000000000" pitchFamily="2" charset="-128"/>
+                <a:ea typeface="Shippori Antique B1" panose="00000500000000000000" pitchFamily="2" charset="-128"/>
+              </a:rPr>
+              <a:t>VSCode</a:t>
+            </a:r>
+            <a:r>
+              <a:rPr lang="en-US" altLang="ja-JP" dirty="0">
+                <a:latin typeface="Shippori Antique B1" panose="00000500000000000000" pitchFamily="2" charset="-128"/>
+                <a:ea typeface="Shippori Antique B1" panose="00000500000000000000" pitchFamily="2" charset="-128"/>
+              </a:rPr>
+              <a:t> Extension</a:t>
+            </a:r>
+            <a:endParaRPr kumimoji="1" lang="ja-JP" altLang="en-US" dirty="0">
+              <a:latin typeface="Shippori Antique B1" panose="00000500000000000000" pitchFamily="2" charset="-128"/>
+              <a:ea typeface="Shippori Antique B1" panose="00000500000000000000" pitchFamily="2" charset="-128"/>
+            </a:endParaRPr>
+          </a:p>
+        </p:txBody>
+      </p:sp>
+      <p:sp>
+        <p:nvSpPr>
+          <p:cNvPr id="12" name="テキスト ボックス 11">
+            <a:extLst>
+              <a:ext uri="{FF2B5EF4-FFF2-40B4-BE49-F238E27FC236}">
+                <a16:creationId xmlns:a16="http://schemas.microsoft.com/office/drawing/2014/main" id="{3EE6E518-3023-4527-88F2-3842B1F625C8}"/>
+              </a:ext>
+            </a:extLst>
+          </p:cNvPr>
+          <p:cNvSpPr txBox="1"/>
+          <p:nvPr/>
+        </p:nvSpPr>
+        <p:spPr>
+          <a:xfrm>
+            <a:off x="201967" y="6535319"/>
+            <a:ext cx="4629915" cy="369332"/>
+          </a:xfrm>
+          <a:prstGeom prst="rect">
+            <a:avLst/>
+          </a:prstGeom>
+          <a:noFill/>
+        </p:spPr>
+        <p:txBody>
+          <a:bodyPr wrap="square" rtlCol="0">
+            <a:spAutoFit/>
+          </a:bodyPr>
+          <a:lstStyle/>
+          <a:p>
+            <a:r>
+              <a:rPr kumimoji="1" lang="en-US" altLang="ja-JP" dirty="0"/>
+              <a:t>ShipporiAntiqueB1-Regular.ttf</a:t>
+            </a:r>
+            <a:endParaRPr kumimoji="1" lang="ja-JP" altLang="en-US" dirty="0"/>
+          </a:p>
+        </p:txBody>
+      </p:sp>
+    </p:spTree>
+    <p:extLst>
+      <p:ext uri="{BB962C8B-B14F-4D97-AF65-F5344CB8AC3E}">
+        <p14:creationId xmlns:p14="http://schemas.microsoft.com/office/powerpoint/2010/main" val="3648381625"/>
+      </p:ext>
+    </p:extLst>
+  </p:cSld>
+  <p:clrMapOvr>
+    <a:masterClrMapping/>
+  </p:clrMapOvr>
+</p:sld>
+</file>
+
 <file path=ppt/theme/theme1.xml><?xml version="1.0" encoding="utf-8"?>
 <a:theme xmlns:a="http://schemas.openxmlformats.org/drawingml/2006/main" name="Office テーマ">
   <a:themeElements>

</xml_diff>